<commit_message>
add auto run sql-init
</commit_message>
<xml_diff>
--- a/thesis/abs/Báo cáo đồ án CN.pptx
+++ b/thesis/abs/Báo cáo đồ án CN.pptx
@@ -31897,7 +31897,7 @@
     <a:masterClrMapping/>
   </p:clrMapOvr>
   <p:transition spd="slow">
-    <p:fade/>
+    <p:push dir="u"/>
   </p:transition>
 </p:sld>
 </file>
@@ -36491,18 +36491,9 @@
   <p:clrMapOvr>
     <a:masterClrMapping/>
   </p:clrMapOvr>
-  <mc:AlternateContent xmlns:mc="http://schemas.openxmlformats.org/markup-compatibility/2006" xmlns:p159="http://schemas.microsoft.com/office/powerpoint/2015/09/main">
-    <mc:Choice Requires="p159">
-      <p:transition spd="slow">
-        <p159:morph option="byObject"/>
-      </p:transition>
-    </mc:Choice>
-    <mc:Fallback xmlns="">
-      <p:transition spd="slow">
-        <p:fade/>
-      </p:transition>
-    </mc:Fallback>
-  </mc:AlternateContent>
+  <p:transition spd="slow">
+    <p:push dir="u"/>
+  </p:transition>
 </p:sld>
 </file>
 
@@ -37492,18 +37483,9 @@
   <p:clrMapOvr>
     <a:masterClrMapping/>
   </p:clrMapOvr>
-  <mc:AlternateContent xmlns:mc="http://schemas.openxmlformats.org/markup-compatibility/2006" xmlns:p159="http://schemas.microsoft.com/office/powerpoint/2015/09/main">
-    <mc:Choice Requires="p159">
-      <p:transition xmlns:p14="http://schemas.microsoft.com/office/powerpoint/2010/main" spd="slow" p14:dur="2000">
-        <p159:morph option="byObject"/>
-      </p:transition>
-    </mc:Choice>
-    <mc:Fallback xmlns="">
-      <p:transition spd="slow">
-        <p:fade/>
-      </p:transition>
-    </mc:Fallback>
-  </mc:AlternateContent>
+  <p:transition spd="slow">
+    <p:push dir="u"/>
+  </p:transition>
 </p:sld>
 </file>
 
@@ -39179,18 +39161,9 @@
   <p:clrMapOvr>
     <a:masterClrMapping/>
   </p:clrMapOvr>
-  <mc:AlternateContent xmlns:mc="http://schemas.openxmlformats.org/markup-compatibility/2006" xmlns:p159="http://schemas.microsoft.com/office/powerpoint/2015/09/main">
-    <mc:Choice Requires="p159">
-      <p:transition spd="slow">
-        <p159:morph option="byObject"/>
-      </p:transition>
-    </mc:Choice>
-    <mc:Fallback xmlns="">
-      <p:transition spd="slow">
-        <p:fade/>
-      </p:transition>
-    </mc:Fallback>
-  </mc:AlternateContent>
+  <p:transition spd="slow">
+    <p:push dir="u"/>
+  </p:transition>
 </p:sld>
 </file>
 
@@ -40443,18 +40416,9 @@
   <p:clrMapOvr>
     <a:masterClrMapping/>
   </p:clrMapOvr>
-  <mc:AlternateContent xmlns:mc="http://schemas.openxmlformats.org/markup-compatibility/2006" xmlns:p159="http://schemas.microsoft.com/office/powerpoint/2015/09/main">
-    <mc:Choice Requires="p159">
-      <p:transition spd="slow">
-        <p159:morph option="byObject"/>
-      </p:transition>
-    </mc:Choice>
-    <mc:Fallback xmlns="">
-      <p:transition spd="slow">
-        <p:fade/>
-      </p:transition>
-    </mc:Fallback>
-  </mc:AlternateContent>
+  <p:transition spd="slow">
+    <p:push dir="u"/>
+  </p:transition>
 </p:sld>
 </file>
 
@@ -41156,18 +41120,9 @@
   <p:clrMapOvr>
     <a:masterClrMapping/>
   </p:clrMapOvr>
-  <mc:AlternateContent xmlns:mc="http://schemas.openxmlformats.org/markup-compatibility/2006" xmlns:p159="http://schemas.microsoft.com/office/powerpoint/2015/09/main">
-    <mc:Choice Requires="p159">
-      <p:transition spd="slow">
-        <p159:morph option="byObject"/>
-      </p:transition>
-    </mc:Choice>
-    <mc:Fallback xmlns="">
-      <p:transition spd="slow">
-        <p:fade/>
-      </p:transition>
-    </mc:Fallback>
-  </mc:AlternateContent>
+  <p:transition spd="slow">
+    <p:push dir="u"/>
+  </p:transition>
 </p:sld>
 </file>
 
@@ -41863,18 +41818,9 @@
   <p:clrMapOvr>
     <a:masterClrMapping/>
   </p:clrMapOvr>
-  <mc:AlternateContent xmlns:mc="http://schemas.openxmlformats.org/markup-compatibility/2006" xmlns:p159="http://schemas.microsoft.com/office/powerpoint/2015/09/main">
-    <mc:Choice Requires="p159">
-      <p:transition spd="slow">
-        <p159:morph option="byObject"/>
-      </p:transition>
-    </mc:Choice>
-    <mc:Fallback xmlns="">
-      <p:transition spd="slow">
-        <p:fade/>
-      </p:transition>
-    </mc:Fallback>
-  </mc:AlternateContent>
+  <p:transition spd="slow">
+    <p:push dir="u"/>
+  </p:transition>
 </p:sld>
 </file>
 
@@ -42578,18 +42524,9 @@
   <p:clrMapOvr>
     <a:masterClrMapping/>
   </p:clrMapOvr>
-  <mc:AlternateContent xmlns:mc="http://schemas.openxmlformats.org/markup-compatibility/2006" xmlns:p159="http://schemas.microsoft.com/office/powerpoint/2015/09/main">
-    <mc:Choice Requires="p159">
-      <p:transition spd="slow">
-        <p159:morph option="byObject"/>
-      </p:transition>
-    </mc:Choice>
-    <mc:Fallback xmlns="">
-      <p:transition spd="slow">
-        <p:fade/>
-      </p:transition>
-    </mc:Fallback>
-  </mc:AlternateContent>
+  <p:transition spd="slow">
+    <p:push dir="u"/>
+  </p:transition>
 </p:sld>
 </file>
 
@@ -43706,18 +43643,9 @@
   <p:clrMapOvr>
     <a:masterClrMapping/>
   </p:clrMapOvr>
-  <mc:AlternateContent xmlns:mc="http://schemas.openxmlformats.org/markup-compatibility/2006" xmlns:p159="http://schemas.microsoft.com/office/powerpoint/2015/09/main">
-    <mc:Choice Requires="p159">
-      <p:transition spd="slow">
-        <p159:morph option="byObject"/>
-      </p:transition>
-    </mc:Choice>
-    <mc:Fallback xmlns="">
-      <p:transition spd="slow">
-        <p:fade/>
-      </p:transition>
-    </mc:Fallback>
-  </mc:AlternateContent>
+  <p:transition spd="slow">
+    <p:push dir="u"/>
+  </p:transition>
 </p:sld>
 </file>
 
@@ -44408,18 +44336,9 @@
   <p:clrMapOvr>
     <a:masterClrMapping/>
   </p:clrMapOvr>
-  <mc:AlternateContent xmlns:mc="http://schemas.openxmlformats.org/markup-compatibility/2006" xmlns:p159="http://schemas.microsoft.com/office/powerpoint/2015/09/main">
-    <mc:Choice Requires="p159">
-      <p:transition spd="slow">
-        <p159:morph option="byObject"/>
-      </p:transition>
-    </mc:Choice>
-    <mc:Fallback xmlns="">
-      <p:transition spd="slow">
-        <p:fade/>
-      </p:transition>
-    </mc:Fallback>
-  </mc:AlternateContent>
+  <p:transition spd="slow">
+    <p:push dir="u"/>
+  </p:transition>
 </p:sld>
 </file>
 
@@ -45381,18 +45300,9 @@
   <p:clrMapOvr>
     <a:masterClrMapping/>
   </p:clrMapOvr>
-  <mc:AlternateContent xmlns:mc="http://schemas.openxmlformats.org/markup-compatibility/2006" xmlns:p159="http://schemas.microsoft.com/office/powerpoint/2015/09/main">
-    <mc:Choice Requires="p159">
-      <p:transition spd="slow">
-        <p159:morph option="byObject"/>
-      </p:transition>
-    </mc:Choice>
-    <mc:Fallback xmlns="">
-      <p:transition spd="slow">
-        <p:fade/>
-      </p:transition>
-    </mc:Fallback>
-  </mc:AlternateContent>
+  <p:transition spd="slow">
+    <p:push dir="u"/>
+  </p:transition>
 </p:sld>
 </file>
 
@@ -46411,18 +46321,9 @@
   <p:clrMapOvr>
     <a:masterClrMapping/>
   </p:clrMapOvr>
-  <mc:AlternateContent xmlns:mc="http://schemas.openxmlformats.org/markup-compatibility/2006" xmlns:p159="http://schemas.microsoft.com/office/powerpoint/2015/09/main">
-    <mc:Choice Requires="p159">
-      <p:transition spd="slow">
-        <p159:morph option="byObject"/>
-      </p:transition>
-    </mc:Choice>
-    <mc:Fallback xmlns="">
-      <p:transition spd="slow">
-        <p:fade/>
-      </p:transition>
-    </mc:Fallback>
-  </mc:AlternateContent>
+  <p:transition spd="slow">
+    <p:push dir="u"/>
+  </p:transition>
 </p:sld>
 </file>
 

</xml_diff>